<commit_message>
WPF hello world Examen - eindwerk toelichting bijgewerkt (foto)
</commit_message>
<xml_diff>
--- a/Cursus/C# Developer - jaar 1.pptx
+++ b/Cursus/C# Developer - jaar 1.pptx
@@ -3585,7 +3585,7 @@
       </p:grpSpPr>
       <p:sp>
         <p:nvSpPr>
-          <p:cNvPr id="29" name="Rectangle 22">
+          <p:cNvPr id="35" name="Rectangle 34">
             <a:extLst>
               <a:ext uri="{FF2B5EF4-FFF2-40B4-BE49-F238E27FC236}">
                 <a16:creationId xmlns:a16="http://schemas.microsoft.com/office/drawing/2014/main" id="{C5E6CFF1-2F42-4E10-9A97-F116F46F53FE}"/>
@@ -3669,7 +3669,7 @@
               </a:ext>
             </a:extLst>
           </a:blip>
-          <a:srcRect t="18182"/>
+          <a:srcRect t="4099" b="10995"/>
           <a:stretch/>
         </p:blipFill>
         <p:spPr>
@@ -3710,9 +3710,9 @@
           </a:bodyPr>
           <a:lstStyle/>
           <a:p>
-            <a:pPr algn="ctr"/>
-            <a:r>
-              <a:rPr lang="en-US" sz="4000" dirty="0" err="1">
+            <a:pPr algn="r"/>
+            <a:r>
+              <a:rPr lang="en-US" sz="4000">
                 <a:solidFill>
                   <a:srgbClr val="FFFFFF"/>
                 </a:solidFill>
@@ -3742,7 +3742,7 @@
               </a:rPr>
             </a:br>
             <a:r>
-              <a:rPr lang="en-US" sz="4000" dirty="0" err="1">
+              <a:rPr lang="en-US" sz="4000">
                 <a:solidFill>
                   <a:srgbClr val="FFFFFF"/>
                 </a:solidFill>
@@ -3757,7 +3757,7 @@
               </a:rPr>
               <a:t> </a:t>
             </a:r>
-            <a:endParaRPr lang="en-IE" sz="4000" dirty="0">
+            <a:endParaRPr lang="en-IE" sz="4000">
               <a:solidFill>
                 <a:srgbClr val="FFFFFF"/>
               </a:solidFill>
@@ -3767,7 +3767,7 @@
       </p:sp>
       <p:cxnSp>
         <p:nvCxnSpPr>
-          <p:cNvPr id="30" name="Straight Connector 24">
+          <p:cNvPr id="37" name="Straight Connector 36">
             <a:extLst>
               <a:ext uri="{FF2B5EF4-FFF2-40B4-BE49-F238E27FC236}">
                 <a16:creationId xmlns:a16="http://schemas.microsoft.com/office/drawing/2014/main" id="{67182200-4859-4C8D-BCBB-55B245C28BA3}"/>
@@ -3835,8 +3835,8 @@
         </p:nvSpPr>
         <p:spPr>
           <a:xfrm>
-            <a:off x="4795938" y="214603"/>
-            <a:ext cx="7259209" cy="6568751"/>
+            <a:off x="5155379" y="1065862"/>
+            <a:ext cx="5744685" cy="4726276"/>
           </a:xfrm>
         </p:spPr>
         <p:txBody>
@@ -3846,7 +3846,7 @@
           <a:lstStyle/>
           <a:p>
             <a:r>
-              <a:rPr lang="nl-BE" sz="2400" dirty="0">
+              <a:rPr lang="nl-BE" sz="2000">
                 <a:solidFill>
                   <a:srgbClr val="FFFFFF"/>
                 </a:solidFill>
@@ -3856,7 +3856,7 @@
           </a:p>
           <a:p>
             <a:r>
-              <a:rPr lang="nl-BE" sz="2400" dirty="0">
+              <a:rPr lang="nl-BE" sz="2000">
                 <a:solidFill>
                   <a:srgbClr val="FFFFFF"/>
                 </a:solidFill>
@@ -3867,7 +3867,7 @@
           <a:p>
             <a:pPr lvl="1"/>
             <a:r>
-              <a:rPr lang="nl-BE" dirty="0">
+              <a:rPr lang="nl-BE" sz="2000">
                 <a:solidFill>
                   <a:srgbClr val="FFFFFF"/>
                 </a:solidFill>
@@ -3878,7 +3878,7 @@
           <a:p>
             <a:pPr lvl="1"/>
             <a:r>
-              <a:rPr lang="nl-BE" dirty="0">
+              <a:rPr lang="nl-BE" sz="2000">
                 <a:solidFill>
                   <a:srgbClr val="FFFFFF"/>
                 </a:solidFill>
@@ -3888,7 +3888,7 @@
           </a:p>
           <a:p>
             <a:r>
-              <a:rPr lang="nl-BE" sz="2400" dirty="0">
+              <a:rPr lang="nl-BE" sz="2000">
                 <a:solidFill>
                   <a:srgbClr val="FFFFFF"/>
                 </a:solidFill>
@@ -3898,7 +3898,7 @@
           </a:p>
           <a:p>
             <a:r>
-              <a:rPr lang="nl-BE" sz="2400" dirty="0">
+              <a:rPr lang="nl-BE" sz="2000">
                 <a:solidFill>
                   <a:srgbClr val="FFFFFF"/>
                 </a:solidFill>
@@ -3908,7 +3908,7 @@
           </a:p>
           <a:p>
             <a:pPr lvl="1"/>
-            <a:endParaRPr lang="en-IE" sz="1900" dirty="0">
+            <a:endParaRPr lang="en-IE" sz="2000">
               <a:solidFill>
                 <a:srgbClr val="FFFFFF"/>
               </a:solidFill>
@@ -6813,7 +6813,7 @@
       </p:grpSpPr>
       <p:sp>
         <p:nvSpPr>
-          <p:cNvPr id="29" name="Rectangle 22">
+          <p:cNvPr id="35" name="Rectangle 34">
             <a:extLst>
               <a:ext uri="{FF2B5EF4-FFF2-40B4-BE49-F238E27FC236}">
                 <a16:creationId xmlns:a16="http://schemas.microsoft.com/office/drawing/2014/main" id="{C5E6CFF1-2F42-4E10-9A97-F116F46F53FE}"/>
@@ -6897,7 +6897,7 @@
               </a:ext>
             </a:extLst>
           </a:blip>
-          <a:srcRect t="18182"/>
+          <a:srcRect t="16572" b="10138"/>
           <a:stretch/>
         </p:blipFill>
         <p:spPr>
@@ -6938,7 +6938,7 @@
           </a:bodyPr>
           <a:lstStyle/>
           <a:p>
-            <a:pPr algn="ctr"/>
+            <a:pPr algn="r"/>
             <a:r>
               <a:rPr lang="en-US" sz="4000" dirty="0">
                 <a:solidFill>
@@ -6947,7 +6947,7 @@
               </a:rPr>
               <a:t>Examen: </a:t>
             </a:r>
-            <a:endParaRPr lang="en-IE" sz="4000" dirty="0">
+            <a:endParaRPr lang="en-IE" sz="4000">
               <a:solidFill>
                 <a:srgbClr val="FFFFFF"/>
               </a:solidFill>
@@ -6957,7 +6957,7 @@
       </p:sp>
       <p:cxnSp>
         <p:nvCxnSpPr>
-          <p:cNvPr id="30" name="Straight Connector 24">
+          <p:cNvPr id="37" name="Straight Connector 36">
             <a:extLst>
               <a:ext uri="{FF2B5EF4-FFF2-40B4-BE49-F238E27FC236}">
                 <a16:creationId xmlns:a16="http://schemas.microsoft.com/office/drawing/2014/main" id="{67182200-4859-4C8D-BCBB-55B245C28BA3}"/>
@@ -7025,8 +7025,8 @@
         </p:nvSpPr>
         <p:spPr>
           <a:xfrm>
-            <a:off x="4795938" y="214603"/>
-            <a:ext cx="7259209" cy="6568751"/>
+            <a:off x="5155379" y="1065862"/>
+            <a:ext cx="5744685" cy="4726276"/>
           </a:xfrm>
         </p:spPr>
         <p:txBody>
@@ -7036,7 +7036,7 @@
           <a:lstStyle/>
           <a:p>
             <a:r>
-              <a:rPr lang="nl-BE" sz="2400" dirty="0">
+              <a:rPr lang="nl-BE" sz="2000">
                 <a:solidFill>
                   <a:srgbClr val="FFFFFF"/>
                 </a:solidFill>
@@ -7046,7 +7046,7 @@
           </a:p>
           <a:p>
             <a:r>
-              <a:rPr lang="nl-BE" sz="2400" dirty="0">
+              <a:rPr lang="nl-BE" sz="2000">
                 <a:solidFill>
                   <a:srgbClr val="FFFFFF"/>
                 </a:solidFill>
@@ -7056,7 +7056,7 @@
           </a:p>
           <a:p>
             <a:r>
-              <a:rPr lang="nl-BE" sz="2400" dirty="0">
+              <a:rPr lang="nl-BE" sz="2000">
                 <a:solidFill>
                   <a:srgbClr val="FFFFFF"/>
                 </a:solidFill>
@@ -7066,7 +7066,7 @@
           </a:p>
           <a:p>
             <a:r>
-              <a:rPr lang="nl-BE" sz="2400" dirty="0">
+              <a:rPr lang="nl-BE" sz="2000">
                 <a:solidFill>
                   <a:srgbClr val="FFFFFF"/>
                 </a:solidFill>
@@ -7076,7 +7076,7 @@
           </a:p>
           <a:p>
             <a:r>
-              <a:rPr lang="nl-BE" sz="2400" dirty="0">
+              <a:rPr lang="nl-BE" sz="2000">
                 <a:solidFill>
                   <a:srgbClr val="FFFFFF"/>
                 </a:solidFill>
@@ -7086,7 +7086,7 @@
           </a:p>
           <a:p>
             <a:r>
-              <a:rPr lang="nl-BE" sz="2400" dirty="0">
+              <a:rPr lang="nl-BE" sz="2000">
                 <a:solidFill>
                   <a:srgbClr val="FFFFFF"/>
                 </a:solidFill>
@@ -7095,7 +7095,7 @@
             </a:r>
           </a:p>
           <a:p>
-            <a:endParaRPr lang="nl-BE" sz="2400" dirty="0">
+            <a:endParaRPr lang="nl-BE" sz="2000">
               <a:solidFill>
                 <a:srgbClr val="FFFFFF"/>
               </a:solidFill>
@@ -7103,7 +7103,7 @@
           </a:p>
           <a:p>
             <a:pPr lvl="1"/>
-            <a:endParaRPr lang="en-IE" sz="1900" dirty="0">
+            <a:endParaRPr lang="en-IE" sz="2000">
               <a:solidFill>
                 <a:srgbClr val="FFFFFF"/>
               </a:solidFill>

</xml_diff>